<commit_message>
Working on Mgmnt Process module
</commit_message>
<xml_diff>
--- a/modules/MgmntProcess/PPT.pptx
+++ b/modules/MgmntProcess/PPT.pptx
@@ -705,6 +705,152 @@
     <p:extLst>
       <p:ext uri="{BB962C8B-B14F-4D97-AF65-F5344CB8AC3E}">
         <p14:creationId xmlns:p14="http://schemas.microsoft.com/office/powerpoint/2010/main" val="3826440508"/>
+      </p:ext>
+    </p:extLst>
+  </p:cSld>
+  <p:clrMapOvr>
+    <a:masterClrMapping/>
+  </p:clrMapOvr>
+</p:notes>
+</file>
+
+<file path=ppt/notesSlides/notesSlide2.xml><?xml version="1.0" encoding="utf-8"?>
+<p:notes xmlns:a="http://schemas.openxmlformats.org/drawingml/2006/main" xmlns:r="http://schemas.openxmlformats.org/officeDocument/2006/relationships" xmlns:p="http://schemas.openxmlformats.org/presentationml/2006/main">
+  <p:cSld>
+    <p:spTree>
+      <p:nvGrpSpPr>
+        <p:cNvPr id="1" name=""/>
+        <p:cNvGrpSpPr/>
+        <p:nvPr/>
+      </p:nvGrpSpPr>
+      <p:grpSpPr>
+        <a:xfrm>
+          <a:off x="0" y="0"/>
+          <a:ext cx="0" cy="0"/>
+          <a:chOff x="0" y="0"/>
+          <a:chExt cx="0" cy="0"/>
+        </a:xfrm>
+      </p:grpSpPr>
+      <p:sp>
+        <p:nvSpPr>
+          <p:cNvPr id="2" name="Slide Image Placeholder 1"/>
+          <p:cNvSpPr>
+            <a:spLocks noGrp="1" noRot="1" noChangeAspect="1"/>
+          </p:cNvSpPr>
+          <p:nvPr>
+            <p:ph type="sldImg"/>
+          </p:nvPr>
+        </p:nvSpPr>
+        <p:spPr/>
+      </p:sp>
+      <p:sp>
+        <p:nvSpPr>
+          <p:cNvPr id="3" name="Notes Placeholder 2"/>
+          <p:cNvSpPr>
+            <a:spLocks noGrp="1"/>
+          </p:cNvSpPr>
+          <p:nvPr>
+            <p:ph type="body" idx="1"/>
+          </p:nvPr>
+        </p:nvSpPr>
+        <p:spPr/>
+        <p:txBody>
+          <a:bodyPr/>
+          <a:lstStyle/>
+          <a:p>
+            <a:pPr eaLnBrk="1" hangingPunct="1"/>
+            <a:r>
+              <a:rPr lang="en-US" b="1" dirty="0" smtClean="0"/>
+              <a:t>Ecological</a:t>
+            </a:r>
+          </a:p>
+          <a:p>
+            <a:pPr lvl="1" eaLnBrk="1" hangingPunct="1"/>
+            <a:r>
+              <a:rPr lang="en-US" dirty="0" smtClean="0"/>
+              <a:t>Walleye abundance, spawning behavior, etc.</a:t>
+            </a:r>
+          </a:p>
+          <a:p>
+            <a:pPr eaLnBrk="1" hangingPunct="1"/>
+            <a:r>
+              <a:rPr lang="en-US" b="1" dirty="0" smtClean="0"/>
+              <a:t>Economic</a:t>
+            </a:r>
+          </a:p>
+          <a:p>
+            <a:pPr lvl="1" eaLnBrk="1" hangingPunct="1"/>
+            <a:r>
+              <a:rPr lang="en-US" dirty="0" smtClean="0"/>
+              <a:t>Impact on recreational fishing (license sales), tourism, enforcement costs, etc.</a:t>
+            </a:r>
+          </a:p>
+          <a:p>
+            <a:pPr eaLnBrk="1" hangingPunct="1"/>
+            <a:r>
+              <a:rPr lang="en-US" b="1" dirty="0" smtClean="0"/>
+              <a:t>Political</a:t>
+            </a:r>
+          </a:p>
+          <a:p>
+            <a:pPr lvl="1" eaLnBrk="1" hangingPunct="1"/>
+            <a:r>
+              <a:rPr lang="en-US" dirty="0" smtClean="0"/>
+              <a:t>Treaties, federal vs. state, racism</a:t>
+            </a:r>
+          </a:p>
+          <a:p>
+            <a:pPr eaLnBrk="1" hangingPunct="1"/>
+            <a:r>
+              <a:rPr lang="en-US" b="1" dirty="0" smtClean="0"/>
+              <a:t>Sociocultural</a:t>
+            </a:r>
+          </a:p>
+          <a:p>
+            <a:pPr lvl="1" eaLnBrk="1" hangingPunct="1"/>
+            <a:r>
+              <a:rPr lang="en-US" smtClean="0"/>
+              <a:t>Native traditions, tourist expectations, racism</a:t>
+            </a:r>
+          </a:p>
+          <a:p>
+            <a:endParaRPr lang="en-US"/>
+          </a:p>
+        </p:txBody>
+      </p:sp>
+      <p:sp>
+        <p:nvSpPr>
+          <p:cNvPr id="4" name="Slide Number Placeholder 3"/>
+          <p:cNvSpPr>
+            <a:spLocks noGrp="1"/>
+          </p:cNvSpPr>
+          <p:nvPr>
+            <p:ph type="sldNum" sz="quarter" idx="10"/>
+          </p:nvPr>
+        </p:nvSpPr>
+        <p:spPr/>
+        <p:txBody>
+          <a:bodyPr/>
+          <a:lstStyle/>
+          <a:p>
+            <a:pPr>
+              <a:defRPr/>
+            </a:pPr>
+            <a:fld id="{F0EDB3E7-DD78-4A95-B5AA-6C1EE68AF305}" type="slidenum">
+              <a:rPr lang="en-US" smtClean="0"/>
+              <a:pPr>
+                <a:defRPr/>
+              </a:pPr>
+              <a:t>5</a:t>
+            </a:fld>
+            <a:endParaRPr lang="en-US"/>
+          </a:p>
+        </p:txBody>
+      </p:sp>
+    </p:spTree>
+    <p:extLst>
+      <p:ext uri="{BB962C8B-B14F-4D97-AF65-F5344CB8AC3E}">
+        <p14:creationId xmlns:p14="http://schemas.microsoft.com/office/powerpoint/2010/main" val="575794154"/>
       </p:ext>
     </p:extLst>
   </p:cSld>
@@ -10120,24 +10266,19 @@
           </a:p>
           <a:p>
             <a:pPr lvl="1" eaLnBrk="1" hangingPunct="1"/>
-            <a:r>
-              <a:rPr lang="en-US" dirty="0" smtClean="0"/>
-              <a:t>Walleye abundance, spawning behavior, etc.</a:t>
-            </a:r>
+            <a:endParaRPr lang="en-US" dirty="0" smtClean="0"/>
           </a:p>
           <a:p>
             <a:pPr eaLnBrk="1" hangingPunct="1"/>
             <a:r>
-              <a:rPr lang="en-US" b="1" dirty="0"/>
+              <a:rPr lang="en-US" b="1" dirty="0" smtClean="0"/>
               <a:t>Economic</a:t>
             </a:r>
+            <a:endParaRPr lang="en-US" b="1" dirty="0"/>
           </a:p>
           <a:p>
             <a:pPr lvl="1" eaLnBrk="1" hangingPunct="1"/>
-            <a:r>
-              <a:rPr lang="en-US" dirty="0"/>
-              <a:t>Impact on recreational fishing (license sales), tourism, enforcement costs, etc.</a:t>
-            </a:r>
+            <a:endParaRPr lang="en-US" dirty="0"/>
           </a:p>
           <a:p>
             <a:pPr eaLnBrk="1" hangingPunct="1"/>
@@ -10148,10 +10289,7 @@
           </a:p>
           <a:p>
             <a:pPr lvl="1" eaLnBrk="1" hangingPunct="1"/>
-            <a:r>
-              <a:rPr lang="en-US" dirty="0"/>
-              <a:t>Treaties, federal vs. state, racism</a:t>
-            </a:r>
+            <a:endParaRPr lang="en-US" dirty="0"/>
           </a:p>
           <a:p>
             <a:pPr eaLnBrk="1" hangingPunct="1"/>
@@ -10162,10 +10300,7 @@
           </a:p>
           <a:p>
             <a:pPr lvl="1" eaLnBrk="1" hangingPunct="1"/>
-            <a:r>
-              <a:rPr lang="en-US" dirty="0" smtClean="0"/>
-              <a:t>Native traditions, tourist expectations, racism</a:t>
-            </a:r>
+            <a:endParaRPr lang="en-US" dirty="0" smtClean="0"/>
           </a:p>
         </p:txBody>
       </p:sp>
@@ -10177,231 +10312,9 @@
   <p:timing>
     <p:tnLst>
       <p:par>
-        <p:cTn id="1" dur="indefinite" restart="never" nodeType="tmRoot">
-          <p:childTnLst>
-            <p:seq concurrent="1" nextAc="seek">
-              <p:cTn id="2" dur="indefinite" nodeType="mainSeq">
-                <p:childTnLst>
-                  <p:par>
-                    <p:cTn id="3" fill="hold" nodeType="clickPar">
-                      <p:stCondLst>
-                        <p:cond delay="indefinite"/>
-                      </p:stCondLst>
-                      <p:childTnLst>
-                        <p:par>
-                          <p:cTn id="4" fill="hold" nodeType="withGroup">
-                            <p:stCondLst>
-                              <p:cond delay="0"/>
-                            </p:stCondLst>
-                            <p:childTnLst>
-                              <p:par>
-                                <p:cTn id="5" presetID="1" presetClass="entr" presetSubtype="0" fill="hold" nodeType="clickEffect">
-                                  <p:stCondLst>
-                                    <p:cond delay="0"/>
-                                  </p:stCondLst>
-                                  <p:childTnLst>
-                                    <p:set>
-                                      <p:cBhvr>
-                                        <p:cTn id="6" dur="1" fill="hold">
-                                          <p:stCondLst>
-                                            <p:cond delay="0"/>
-                                          </p:stCondLst>
-                                        </p:cTn>
-                                        <p:tgtEl>
-                                          <p:spTgt spid="39939">
-                                            <p:txEl>
-                                              <p:pRg st="1" end="1"/>
-                                            </p:txEl>
-                                          </p:spTgt>
-                                        </p:tgtEl>
-                                        <p:attrNameLst>
-                                          <p:attrName>style.visibility</p:attrName>
-                                        </p:attrNameLst>
-                                      </p:cBhvr>
-                                      <p:to>
-                                        <p:strVal val="visible"/>
-                                      </p:to>
-                                    </p:set>
-                                  </p:childTnLst>
-                                </p:cTn>
-                              </p:par>
-                            </p:childTnLst>
-                          </p:cTn>
-                        </p:par>
-                      </p:childTnLst>
-                    </p:cTn>
-                  </p:par>
-                  <p:par>
-                    <p:cTn id="7" fill="hold">
-                      <p:stCondLst>
-                        <p:cond delay="indefinite"/>
-                      </p:stCondLst>
-                      <p:childTnLst>
-                        <p:par>
-                          <p:cTn id="8" fill="hold">
-                            <p:stCondLst>
-                              <p:cond delay="0"/>
-                            </p:stCondLst>
-                            <p:childTnLst>
-                              <p:par>
-                                <p:cTn id="9" presetID="1" presetClass="entr" presetSubtype="0" fill="hold" grpId="0" nodeType="clickEffect">
-                                  <p:stCondLst>
-                                    <p:cond delay="0"/>
-                                  </p:stCondLst>
-                                  <p:childTnLst>
-                                    <p:set>
-                                      <p:cBhvr>
-                                        <p:cTn id="10" dur="1" fill="hold">
-                                          <p:stCondLst>
-                                            <p:cond delay="0"/>
-                                          </p:stCondLst>
-                                        </p:cTn>
-                                        <p:tgtEl>
-                                          <p:spTgt spid="39939">
-                                            <p:txEl>
-                                              <p:pRg st="3" end="3"/>
-                                            </p:txEl>
-                                          </p:spTgt>
-                                        </p:tgtEl>
-                                        <p:attrNameLst>
-                                          <p:attrName>style.visibility</p:attrName>
-                                        </p:attrNameLst>
-                                      </p:cBhvr>
-                                      <p:to>
-                                        <p:strVal val="visible"/>
-                                      </p:to>
-                                    </p:set>
-                                  </p:childTnLst>
-                                </p:cTn>
-                              </p:par>
-                            </p:childTnLst>
-                          </p:cTn>
-                        </p:par>
-                      </p:childTnLst>
-                    </p:cTn>
-                  </p:par>
-                  <p:par>
-                    <p:cTn id="11" fill="hold">
-                      <p:stCondLst>
-                        <p:cond delay="indefinite"/>
-                      </p:stCondLst>
-                      <p:childTnLst>
-                        <p:par>
-                          <p:cTn id="12" fill="hold">
-                            <p:stCondLst>
-                              <p:cond delay="0"/>
-                            </p:stCondLst>
-                            <p:childTnLst>
-                              <p:par>
-                                <p:cTn id="13" presetID="1" presetClass="entr" presetSubtype="0" fill="hold" grpId="0" nodeType="clickEffect">
-                                  <p:stCondLst>
-                                    <p:cond delay="0"/>
-                                  </p:stCondLst>
-                                  <p:childTnLst>
-                                    <p:set>
-                                      <p:cBhvr>
-                                        <p:cTn id="14" dur="1" fill="hold">
-                                          <p:stCondLst>
-                                            <p:cond delay="0"/>
-                                          </p:stCondLst>
-                                        </p:cTn>
-                                        <p:tgtEl>
-                                          <p:spTgt spid="39939">
-                                            <p:txEl>
-                                              <p:pRg st="5" end="5"/>
-                                            </p:txEl>
-                                          </p:spTgt>
-                                        </p:tgtEl>
-                                        <p:attrNameLst>
-                                          <p:attrName>style.visibility</p:attrName>
-                                        </p:attrNameLst>
-                                      </p:cBhvr>
-                                      <p:to>
-                                        <p:strVal val="visible"/>
-                                      </p:to>
-                                    </p:set>
-                                  </p:childTnLst>
-                                </p:cTn>
-                              </p:par>
-                            </p:childTnLst>
-                          </p:cTn>
-                        </p:par>
-                      </p:childTnLst>
-                    </p:cTn>
-                  </p:par>
-                  <p:par>
-                    <p:cTn id="15" fill="hold">
-                      <p:stCondLst>
-                        <p:cond delay="indefinite"/>
-                      </p:stCondLst>
-                      <p:childTnLst>
-                        <p:par>
-                          <p:cTn id="16" fill="hold">
-                            <p:stCondLst>
-                              <p:cond delay="0"/>
-                            </p:stCondLst>
-                            <p:childTnLst>
-                              <p:par>
-                                <p:cTn id="17" presetID="1" presetClass="entr" presetSubtype="0" fill="hold" grpId="0" nodeType="clickEffect">
-                                  <p:stCondLst>
-                                    <p:cond delay="0"/>
-                                  </p:stCondLst>
-                                  <p:childTnLst>
-                                    <p:set>
-                                      <p:cBhvr>
-                                        <p:cTn id="18" dur="1" fill="hold">
-                                          <p:stCondLst>
-                                            <p:cond delay="0"/>
-                                          </p:stCondLst>
-                                        </p:cTn>
-                                        <p:tgtEl>
-                                          <p:spTgt spid="39939">
-                                            <p:txEl>
-                                              <p:pRg st="7" end="7"/>
-                                            </p:txEl>
-                                          </p:spTgt>
-                                        </p:tgtEl>
-                                        <p:attrNameLst>
-                                          <p:attrName>style.visibility</p:attrName>
-                                        </p:attrNameLst>
-                                      </p:cBhvr>
-                                      <p:to>
-                                        <p:strVal val="visible"/>
-                                      </p:to>
-                                    </p:set>
-                                  </p:childTnLst>
-                                </p:cTn>
-                              </p:par>
-                            </p:childTnLst>
-                          </p:cTn>
-                        </p:par>
-                      </p:childTnLst>
-                    </p:cTn>
-                  </p:par>
-                </p:childTnLst>
-              </p:cTn>
-              <p:prevCondLst>
-                <p:cond evt="onPrev" delay="0">
-                  <p:tgtEl>
-                    <p:sldTgt/>
-                  </p:tgtEl>
-                </p:cond>
-              </p:prevCondLst>
-              <p:nextCondLst>
-                <p:cond evt="onNext" delay="0">
-                  <p:tgtEl>
-                    <p:sldTgt/>
-                  </p:tgtEl>
-                </p:cond>
-              </p:nextCondLst>
-            </p:seq>
-          </p:childTnLst>
-        </p:cTn>
+        <p:cTn id="1" dur="indefinite" restart="never" nodeType="tmRoot"/>
       </p:par>
     </p:tnLst>
-    <p:bldLst>
-      <p:bldP spid="39939" grpId="0" uiExpand="1" build="p"/>
-    </p:bldLst>
   </p:timing>
 </p:sld>
 </file>

</xml_diff>